<commit_message>
promjena slike u prezentaciji
promjena slike dijagrama obrazaca uporabe
</commit_message>
<xml_diff>
--- a/Dokumentacija/PROGI_Prezentacija.pptx
+++ b/Dokumentacija/PROGI_Prezentacija.pptx
@@ -213,7 +213,7 @@
           <a:p>
             <a:fld id="{A57596D4-CB16-4BAD-83F6-7E8077D61F81}" type="datetimeFigureOut">
               <a:rPr lang="hr-HR" smtClean="0"/>
-              <a:t>19.1.2024.</a:t>
+              <a:t>21.1.2024.</a:t>
             </a:fld>
             <a:endParaRPr lang="hr-HR"/>
           </a:p>
@@ -3910,7 +3910,7 @@
           <a:p>
             <a:fld id="{E46E8F5E-7C26-4DBA-9CDF-6E3092DFB447}" type="datetime1">
               <a:rPr lang="hr-HR" smtClean="0"/>
-              <a:t>19.1.2024.</a:t>
+              <a:t>21.1.2024.</a:t>
             </a:fld>
             <a:endParaRPr lang="hr-HR"/>
           </a:p>
@@ -4136,7 +4136,7 @@
           <a:p>
             <a:fld id="{E46E8F5E-7C26-4DBA-9CDF-6E3092DFB447}" type="datetime1">
               <a:rPr lang="hr-HR" smtClean="0"/>
-              <a:t>19.1.2024.</a:t>
+              <a:t>21.1.2024.</a:t>
             </a:fld>
             <a:endParaRPr lang="hr-HR"/>
           </a:p>
@@ -7296,9 +7296,16 @@
             <p:ph type="title"/>
           </p:nvPr>
         </p:nvSpPr>
-        <p:spPr/>
+        <p:spPr>
+          <a:xfrm>
+            <a:off x="628650" y="365127"/>
+            <a:ext cx="7886700" cy="844838"/>
+          </a:xfrm>
+        </p:spPr>
         <p:txBody>
-          <a:bodyPr/>
+          <a:bodyPr anchor="ctr">
+            <a:normAutofit/>
+          </a:bodyPr>
           <a:lstStyle/>
           <a:p>
             <a:r>
@@ -7308,6 +7315,43 @@
           </a:p>
         </p:txBody>
       </p:sp>
+      <p:pic>
+        <p:nvPicPr>
+          <p:cNvPr id="5" name="Slika 4" descr="Slika na kojoj se prikazuje tekst, dijagram, crta, snimka zaslona&#10;&#10;Opis je automatski generiran">
+            <a:extLst>
+              <a:ext uri="{FF2B5EF4-FFF2-40B4-BE49-F238E27FC236}">
+                <a16:creationId xmlns:a16="http://schemas.microsoft.com/office/drawing/2014/main" id="{8E3208D2-8778-875E-CBDC-194E03DCA99B}"/>
+              </a:ext>
+            </a:extLst>
+          </p:cNvPr>
+          <p:cNvPicPr>
+            <a:picLocks noChangeAspect="1"/>
+          </p:cNvPicPr>
+          <p:nvPr/>
+        </p:nvPicPr>
+        <p:blipFill>
+          <a:blip r:embed="rId2" cstate="print">
+            <a:extLst>
+              <a:ext uri="{28A0092B-C50C-407E-A947-70E740481C1C}">
+                <a14:useLocalDpi xmlns:a14="http://schemas.microsoft.com/office/drawing/2010/main" val="0"/>
+              </a:ext>
+            </a:extLst>
+          </a:blip>
+          <a:stretch>
+            <a:fillRect/>
+          </a:stretch>
+        </p:blipFill>
+        <p:spPr>
+          <a:xfrm>
+            <a:off x="1869903" y="1395554"/>
+            <a:ext cx="5404194" cy="4931327"/>
+          </a:xfrm>
+          <a:prstGeom prst="rect">
+            <a:avLst/>
+          </a:prstGeom>
+          <a:noFill/>
+        </p:spPr>
+      </p:pic>
       <p:sp>
         <p:nvSpPr>
           <p:cNvPr id="4" name="Slide Number Placeholder 3"/>
@@ -7318,49 +7362,36 @@
             <p:ph type="sldNum" sz="quarter" idx="12"/>
           </p:nvPr>
         </p:nvSpPr>
-        <p:spPr/>
+        <p:spPr>
+          <a:xfrm>
+            <a:off x="7989455" y="6492873"/>
+            <a:ext cx="525895" cy="365125"/>
+          </a:xfrm>
+        </p:spPr>
         <p:txBody>
-          <a:bodyPr/>
+          <a:bodyPr anchor="t">
+            <a:normAutofit/>
+          </a:bodyPr>
           <a:lstStyle/>
           <a:p>
+            <a:pPr>
+              <a:spcAft>
+                <a:spcPts val="600"/>
+              </a:spcAft>
+            </a:pPr>
             <a:fld id="{FAA41844-C0CA-4144-9D6C-D993F0C0FAB4}" type="slidenum">
               <a:rPr lang="hr-HR" smtClean="0"/>
+              <a:pPr>
+                <a:spcAft>
+                  <a:spcPts val="600"/>
+                </a:spcAft>
+              </a:pPr>
               <a:t>5</a:t>
             </a:fld>
             <a:endParaRPr lang="hr-HR"/>
           </a:p>
         </p:txBody>
       </p:sp>
-      <p:pic>
-        <p:nvPicPr>
-          <p:cNvPr id="8" name="Picture 7">
-            <a:extLst>
-              <a:ext uri="{FF2B5EF4-FFF2-40B4-BE49-F238E27FC236}">
-                <a16:creationId xmlns:a16="http://schemas.microsoft.com/office/drawing/2014/main" id="{C1ADF428-A619-C587-31E0-46A9DA1154A4}"/>
-              </a:ext>
-            </a:extLst>
-          </p:cNvPr>
-          <p:cNvPicPr>
-            <a:picLocks noChangeAspect="1"/>
-          </p:cNvPicPr>
-          <p:nvPr/>
-        </p:nvPicPr>
-        <p:blipFill>
-          <a:blip r:embed="rId2"/>
-          <a:stretch>
-            <a:fillRect/>
-          </a:stretch>
-        </p:blipFill>
-        <p:spPr>
-          <a:xfrm>
-            <a:off x="2091647" y="1293940"/>
-            <a:ext cx="4960705" cy="5282908"/>
-          </a:xfrm>
-          <a:prstGeom prst="rect">
-            <a:avLst/>
-          </a:prstGeom>
-        </p:spPr>
-      </p:pic>
     </p:spTree>
     <p:extLst>
       <p:ext uri="{BB962C8B-B14F-4D97-AF65-F5344CB8AC3E}">

</xml_diff>